<commit_message>
presentazione pcto e aggiunte su elaborato
</commit_message>
<xml_diff>
--- a/presentazioni/pcto/presentazione_pcto.pptx
+++ b/presentazioni/pcto/presentazione_pcto.pptx
@@ -6,6 +6,8 @@
   </p:sldMasterIdLst>
   <p:sldIdLst>
     <p:sldId id="256" r:id="rId2"/>
+    <p:sldId id="257" r:id="rId3"/>
+    <p:sldId id="258" r:id="rId4"/>
   </p:sldIdLst>
   <p:sldSz cx="9144000" cy="6858000" type="screen4x3"/>
   <p:notesSz cx="6858000" cy="9144000"/>
@@ -289,7 +291,7 @@
             <a:fld id="{4B6055F8-1D02-4417-9241-55C834FD9970}" type="datetimeFigureOut">
               <a:rPr lang="it-IT" smtClean="0"/>
               <a:pPr/>
-              <a:t>30/05/2021</a:t>
+              <a:t>31/05/2021</a:t>
             </a:fld>
             <a:endParaRPr lang="it-IT"/>
           </a:p>
@@ -456,7 +458,7 @@
             <a:fld id="{4B6055F8-1D02-4417-9241-55C834FD9970}" type="datetimeFigureOut">
               <a:rPr lang="it-IT" smtClean="0"/>
               <a:pPr/>
-              <a:t>30/05/2021</a:t>
+              <a:t>31/05/2021</a:t>
             </a:fld>
             <a:endParaRPr lang="it-IT"/>
           </a:p>
@@ -633,7 +635,7 @@
             <a:fld id="{4B6055F8-1D02-4417-9241-55C834FD9970}" type="datetimeFigureOut">
               <a:rPr lang="it-IT" smtClean="0"/>
               <a:pPr/>
-              <a:t>30/05/2021</a:t>
+              <a:t>31/05/2021</a:t>
             </a:fld>
             <a:endParaRPr lang="it-IT"/>
           </a:p>
@@ -800,7 +802,7 @@
             <a:fld id="{4B6055F8-1D02-4417-9241-55C834FD9970}" type="datetimeFigureOut">
               <a:rPr lang="it-IT" smtClean="0"/>
               <a:pPr/>
-              <a:t>30/05/2021</a:t>
+              <a:t>31/05/2021</a:t>
             </a:fld>
             <a:endParaRPr lang="it-IT"/>
           </a:p>
@@ -1043,7 +1045,7 @@
             <a:fld id="{4B6055F8-1D02-4417-9241-55C834FD9970}" type="datetimeFigureOut">
               <a:rPr lang="it-IT" smtClean="0"/>
               <a:pPr/>
-              <a:t>30/05/2021</a:t>
+              <a:t>31/05/2021</a:t>
             </a:fld>
             <a:endParaRPr lang="it-IT"/>
           </a:p>
@@ -1328,7 +1330,7 @@
             <a:fld id="{4B6055F8-1D02-4417-9241-55C834FD9970}" type="datetimeFigureOut">
               <a:rPr lang="it-IT" smtClean="0"/>
               <a:pPr/>
-              <a:t>30/05/2021</a:t>
+              <a:t>31/05/2021</a:t>
             </a:fld>
             <a:endParaRPr lang="it-IT"/>
           </a:p>
@@ -1747,7 +1749,7 @@
             <a:fld id="{4B6055F8-1D02-4417-9241-55C834FD9970}" type="datetimeFigureOut">
               <a:rPr lang="it-IT" smtClean="0"/>
               <a:pPr/>
-              <a:t>30/05/2021</a:t>
+              <a:t>31/05/2021</a:t>
             </a:fld>
             <a:endParaRPr lang="it-IT"/>
           </a:p>
@@ -1862,7 +1864,7 @@
             <a:fld id="{4B6055F8-1D02-4417-9241-55C834FD9970}" type="datetimeFigureOut">
               <a:rPr lang="it-IT" smtClean="0"/>
               <a:pPr/>
-              <a:t>30/05/2021</a:t>
+              <a:t>31/05/2021</a:t>
             </a:fld>
             <a:endParaRPr lang="it-IT"/>
           </a:p>
@@ -1954,7 +1956,7 @@
             <a:fld id="{4B6055F8-1D02-4417-9241-55C834FD9970}" type="datetimeFigureOut">
               <a:rPr lang="it-IT" smtClean="0"/>
               <a:pPr/>
-              <a:t>30/05/2021</a:t>
+              <a:t>31/05/2021</a:t>
             </a:fld>
             <a:endParaRPr lang="it-IT"/>
           </a:p>
@@ -2228,7 +2230,7 @@
             <a:fld id="{4B6055F8-1D02-4417-9241-55C834FD9970}" type="datetimeFigureOut">
               <a:rPr lang="it-IT" smtClean="0"/>
               <a:pPr/>
-              <a:t>30/05/2021</a:t>
+              <a:t>31/05/2021</a:t>
             </a:fld>
             <a:endParaRPr lang="it-IT"/>
           </a:p>
@@ -2478,7 +2480,7 @@
             <a:fld id="{4B6055F8-1D02-4417-9241-55C834FD9970}" type="datetimeFigureOut">
               <a:rPr lang="it-IT" smtClean="0"/>
               <a:pPr/>
-              <a:t>30/05/2021</a:t>
+              <a:t>31/05/2021</a:t>
             </a:fld>
             <a:endParaRPr lang="it-IT"/>
           </a:p>
@@ -2688,7 +2690,7 @@
             <a:fld id="{4B6055F8-1D02-4417-9241-55C834FD9970}" type="datetimeFigureOut">
               <a:rPr lang="it-IT" smtClean="0"/>
               <a:pPr/>
-              <a:t>30/05/2021</a:t>
+              <a:t>31/05/2021</a:t>
             </a:fld>
             <a:endParaRPr lang="it-IT"/>
           </a:p>
@@ -3234,13 +3236,13 @@
               <a:t> Presso </a:t>
             </a:r>
             <a:r>
-              <a:rPr lang="it-IT" sz="2400" i="1" dirty="0" err="1" smtClean="0">
+              <a:rPr lang="it-IT" sz="2400" b="1" i="1" dirty="0" err="1" smtClean="0">
                 <a:latin typeface="Times New Roman" pitchFamily="18" charset="0"/>
                 <a:cs typeface="Times New Roman" pitchFamily="18" charset="0"/>
               </a:rPr>
               <a:t>Plansoft</a:t>
             </a:r>
-            <a:endParaRPr lang="it-IT" sz="2400" i="1" dirty="0" smtClean="0">
+            <a:endParaRPr lang="it-IT" sz="2400" b="1" i="1" dirty="0" smtClean="0">
               <a:latin typeface="Times New Roman" pitchFamily="18" charset="0"/>
               <a:cs typeface="Times New Roman" pitchFamily="18" charset="0"/>
             </a:endParaRPr>
@@ -3368,6 +3370,628 @@
           <a:xfrm>
             <a:off x="5940152" y="1268760"/>
             <a:ext cx="2520280" cy="672074"/>
+          </a:xfrm>
+          <a:prstGeom prst="rect">
+            <a:avLst/>
+          </a:prstGeom>
+          <a:noFill/>
+        </p:spPr>
+      </p:pic>
+    </p:spTree>
+  </p:cSld>
+  <p:clrMapOvr>
+    <a:masterClrMapping/>
+  </p:clrMapOvr>
+  <p:timing>
+    <p:tnLst>
+      <p:par>
+        <p:cTn id="1" dur="indefinite" restart="never" nodeType="tmRoot"/>
+      </p:par>
+    </p:tnLst>
+  </p:timing>
+</p:sld>
+</file>
+
+<file path=ppt/slides/slide2.xml><?xml version="1.0" encoding="utf-8"?>
+<p:sld xmlns:a="http://schemas.openxmlformats.org/drawingml/2006/main" xmlns:r="http://schemas.openxmlformats.org/officeDocument/2006/relationships" xmlns:p="http://schemas.openxmlformats.org/presentationml/2006/main">
+  <p:cSld>
+    <p:spTree>
+      <p:nvGrpSpPr>
+        <p:cNvPr id="1" name=""/>
+        <p:cNvGrpSpPr/>
+        <p:nvPr/>
+      </p:nvGrpSpPr>
+      <p:grpSpPr>
+        <a:xfrm>
+          <a:off x="0" y="0"/>
+          <a:ext cx="0" cy="0"/>
+          <a:chOff x="0" y="0"/>
+          <a:chExt cx="0" cy="0"/>
+        </a:xfrm>
+      </p:grpSpPr>
+      <p:pic>
+        <p:nvPicPr>
+          <p:cNvPr id="1026" name="Picture 2" descr="C:\Users\Stefano\Desktop\Informatica\Maturita2021\elaborato\logo_gv.jpg"/>
+          <p:cNvPicPr>
+            <a:picLocks noChangeAspect="1" noChangeArrowheads="1"/>
+          </p:cNvPicPr>
+          <p:nvPr/>
+        </p:nvPicPr>
+        <p:blipFill>
+          <a:blip r:embed="rId2" cstate="print"/>
+          <a:srcRect/>
+          <a:stretch>
+            <a:fillRect/>
+          </a:stretch>
+        </p:blipFill>
+        <p:spPr bwMode="auto">
+          <a:xfrm>
+            <a:off x="0" y="0"/>
+            <a:ext cx="2555776" cy="863573"/>
+          </a:xfrm>
+          <a:prstGeom prst="rect">
+            <a:avLst/>
+          </a:prstGeom>
+          <a:noFill/>
+        </p:spPr>
+      </p:pic>
+      <p:sp>
+        <p:nvSpPr>
+          <p:cNvPr id="5" name="CasellaDiTesto 4"/>
+          <p:cNvSpPr txBox="1"/>
+          <p:nvPr/>
+        </p:nvSpPr>
+        <p:spPr>
+          <a:xfrm>
+            <a:off x="7320039" y="6021288"/>
+            <a:ext cx="1823961" cy="923330"/>
+          </a:xfrm>
+          <a:prstGeom prst="rect">
+            <a:avLst/>
+          </a:prstGeom>
+          <a:noFill/>
+        </p:spPr>
+        <p:txBody>
+          <a:bodyPr wrap="square" rtlCol="0">
+            <a:spAutoFit/>
+          </a:bodyPr>
+          <a:lstStyle/>
+          <a:p>
+            <a:pPr>
+              <a:lnSpc>
+                <a:spcPct val="300000"/>
+              </a:lnSpc>
+              <a:spcAft>
+                <a:spcPts val="1200"/>
+              </a:spcAft>
+            </a:pPr>
+            <a:r>
+              <a:rPr lang="it-IT" i="1" dirty="0" smtClean="0">
+                <a:solidFill>
+                  <a:schemeClr val="tx1">
+                    <a:lumMod val="85000"/>
+                    <a:lumOff val="15000"/>
+                  </a:schemeClr>
+                </a:solidFill>
+                <a:latin typeface="Times New Roman" pitchFamily="18" charset="0"/>
+                <a:cs typeface="Times New Roman" pitchFamily="18" charset="0"/>
+              </a:rPr>
+              <a:t>Lorenzo Bartolini</a:t>
+            </a:r>
+            <a:endParaRPr lang="it-IT" i="1" dirty="0">
+              <a:solidFill>
+                <a:schemeClr val="tx1">
+                  <a:lumMod val="85000"/>
+                  <a:lumOff val="15000"/>
+                </a:schemeClr>
+              </a:solidFill>
+              <a:latin typeface="Times New Roman" pitchFamily="18" charset="0"/>
+              <a:cs typeface="Times New Roman" pitchFamily="18" charset="0"/>
+            </a:endParaRPr>
+          </a:p>
+        </p:txBody>
+      </p:sp>
+      <p:sp>
+        <p:nvSpPr>
+          <p:cNvPr id="6" name="CasellaDiTesto 5"/>
+          <p:cNvSpPr txBox="1"/>
+          <p:nvPr/>
+        </p:nvSpPr>
+        <p:spPr>
+          <a:xfrm>
+            <a:off x="827584" y="1196752"/>
+            <a:ext cx="4680520" cy="1077218"/>
+          </a:xfrm>
+          <a:prstGeom prst="rect">
+            <a:avLst/>
+          </a:prstGeom>
+          <a:noFill/>
+        </p:spPr>
+        <p:txBody>
+          <a:bodyPr wrap="square" rtlCol="0">
+            <a:spAutoFit/>
+          </a:bodyPr>
+          <a:lstStyle/>
+          <a:p>
+            <a:r>
+              <a:rPr lang="it-IT" sz="3200" b="1" dirty="0" smtClean="0">
+                <a:latin typeface="Times New Roman" pitchFamily="18" charset="0"/>
+                <a:cs typeface="Times New Roman" pitchFamily="18" charset="0"/>
+              </a:rPr>
+              <a:t>Competenze trasversali acquisite</a:t>
+            </a:r>
+            <a:endParaRPr lang="it-IT" sz="3200" b="1" dirty="0">
+              <a:latin typeface="Times New Roman" pitchFamily="18" charset="0"/>
+              <a:cs typeface="Times New Roman" pitchFamily="18" charset="0"/>
+            </a:endParaRPr>
+          </a:p>
+        </p:txBody>
+      </p:sp>
+      <p:sp>
+        <p:nvSpPr>
+          <p:cNvPr id="7" name="CasellaDiTesto 6"/>
+          <p:cNvSpPr txBox="1"/>
+          <p:nvPr/>
+        </p:nvSpPr>
+        <p:spPr>
+          <a:xfrm>
+            <a:off x="971600" y="2636912"/>
+            <a:ext cx="3971600" cy="2308324"/>
+          </a:xfrm>
+          <a:prstGeom prst="rect">
+            <a:avLst/>
+          </a:prstGeom>
+          <a:noFill/>
+        </p:spPr>
+        <p:txBody>
+          <a:bodyPr wrap="none" rtlCol="0">
+            <a:spAutoFit/>
+          </a:bodyPr>
+          <a:lstStyle/>
+          <a:p>
+            <a:pPr>
+              <a:buFont typeface="Arial" pitchFamily="34" charset="0"/>
+              <a:buChar char="•"/>
+            </a:pPr>
+            <a:r>
+              <a:rPr lang="it-IT" sz="2400" dirty="0" smtClean="0">
+                <a:latin typeface="Times New Roman" pitchFamily="18" charset="0"/>
+                <a:cs typeface="Times New Roman" pitchFamily="18" charset="0"/>
+              </a:rPr>
+              <a:t> </a:t>
+            </a:r>
+            <a:r>
+              <a:rPr lang="it-IT" sz="2400" dirty="0" smtClean="0">
+                <a:latin typeface="Times New Roman" pitchFamily="18" charset="0"/>
+                <a:cs typeface="Times New Roman" pitchFamily="18" charset="0"/>
+              </a:rPr>
+              <a:t>Apprendimento in autonomia</a:t>
+            </a:r>
+            <a:endParaRPr lang="it-IT" sz="2400" dirty="0" smtClean="0">
+              <a:latin typeface="Times New Roman" pitchFamily="18" charset="0"/>
+              <a:cs typeface="Times New Roman" pitchFamily="18" charset="0"/>
+            </a:endParaRPr>
+          </a:p>
+          <a:p>
+            <a:pPr>
+              <a:buFont typeface="Arial" pitchFamily="34" charset="0"/>
+              <a:buChar char="•"/>
+            </a:pPr>
+            <a:endParaRPr lang="it-IT" sz="2400" dirty="0" smtClean="0">
+              <a:latin typeface="Times New Roman" pitchFamily="18" charset="0"/>
+              <a:cs typeface="Times New Roman" pitchFamily="18" charset="0"/>
+            </a:endParaRPr>
+          </a:p>
+          <a:p>
+            <a:pPr>
+              <a:buFont typeface="Arial" pitchFamily="34" charset="0"/>
+              <a:buChar char="•"/>
+            </a:pPr>
+            <a:r>
+              <a:rPr lang="it-IT" sz="2400" dirty="0" smtClean="0">
+                <a:latin typeface="Times New Roman" pitchFamily="18" charset="0"/>
+                <a:cs typeface="Times New Roman" pitchFamily="18" charset="0"/>
+              </a:rPr>
+              <a:t> </a:t>
+            </a:r>
+            <a:r>
+              <a:rPr lang="it-IT" sz="2400" dirty="0" smtClean="0">
+                <a:latin typeface="Times New Roman" pitchFamily="18" charset="0"/>
+                <a:cs typeface="Times New Roman" pitchFamily="18" charset="0"/>
+              </a:rPr>
+              <a:t>Collaborazione tra pari</a:t>
+            </a:r>
+            <a:endParaRPr lang="it-IT" sz="2400" b="1" i="1" dirty="0" smtClean="0">
+              <a:latin typeface="Times New Roman" pitchFamily="18" charset="0"/>
+              <a:cs typeface="Times New Roman" pitchFamily="18" charset="0"/>
+            </a:endParaRPr>
+          </a:p>
+          <a:p>
+            <a:pPr>
+              <a:buFont typeface="Arial" pitchFamily="34" charset="0"/>
+              <a:buChar char="•"/>
+            </a:pPr>
+            <a:endParaRPr lang="it-IT" sz="2400" i="1" dirty="0" smtClean="0">
+              <a:latin typeface="Times New Roman" pitchFamily="18" charset="0"/>
+              <a:cs typeface="Times New Roman" pitchFamily="18" charset="0"/>
+            </a:endParaRPr>
+          </a:p>
+          <a:p>
+            <a:pPr>
+              <a:buFont typeface="Arial" pitchFamily="34" charset="0"/>
+              <a:buChar char="•"/>
+            </a:pPr>
+            <a:r>
+              <a:rPr lang="it-IT" sz="2400" i="1" dirty="0" smtClean="0">
+                <a:latin typeface="Times New Roman" pitchFamily="18" charset="0"/>
+                <a:cs typeface="Times New Roman" pitchFamily="18" charset="0"/>
+              </a:rPr>
+              <a:t> </a:t>
+            </a:r>
+            <a:r>
+              <a:rPr lang="it-IT" sz="2400" dirty="0" smtClean="0">
+                <a:latin typeface="Times New Roman" pitchFamily="18" charset="0"/>
+                <a:cs typeface="Times New Roman" pitchFamily="18" charset="0"/>
+              </a:rPr>
+              <a:t>Teamwork</a:t>
+            </a:r>
+            <a:endParaRPr lang="it-IT" sz="2400" i="1" dirty="0" smtClean="0">
+              <a:latin typeface="Times New Roman" pitchFamily="18" charset="0"/>
+              <a:cs typeface="Times New Roman" pitchFamily="18" charset="0"/>
+            </a:endParaRPr>
+          </a:p>
+          <a:p>
+            <a:pPr>
+              <a:buFont typeface="Arial" pitchFamily="34" charset="0"/>
+              <a:buChar char="•"/>
+            </a:pPr>
+            <a:endParaRPr lang="it-IT" sz="2400" i="1" dirty="0" smtClean="0">
+              <a:latin typeface="Times New Roman" pitchFamily="18" charset="0"/>
+              <a:cs typeface="Times New Roman" pitchFamily="18" charset="0"/>
+            </a:endParaRPr>
+          </a:p>
+        </p:txBody>
+      </p:sp>
+      <p:pic>
+        <p:nvPicPr>
+          <p:cNvPr id="1027" name="Picture 3" descr="C:\Users\Stefano\Desktop\Informatica\Maturita2021\presentazioni\pcto\cropped-plansoft-logo-s-1.png"/>
+          <p:cNvPicPr>
+            <a:picLocks noChangeAspect="1" noChangeArrowheads="1"/>
+          </p:cNvPicPr>
+          <p:nvPr/>
+        </p:nvPicPr>
+        <p:blipFill>
+          <a:blip r:embed="rId3" cstate="print"/>
+          <a:srcRect/>
+          <a:stretch>
+            <a:fillRect/>
+          </a:stretch>
+        </p:blipFill>
+        <p:spPr bwMode="auto">
+          <a:xfrm>
+            <a:off x="5940152" y="1268760"/>
+            <a:ext cx="2520280" cy="672074"/>
+          </a:xfrm>
+          <a:prstGeom prst="rect">
+            <a:avLst/>
+          </a:prstGeom>
+          <a:noFill/>
+        </p:spPr>
+      </p:pic>
+    </p:spTree>
+  </p:cSld>
+  <p:clrMapOvr>
+    <a:masterClrMapping/>
+  </p:clrMapOvr>
+  <p:timing>
+    <p:tnLst>
+      <p:par>
+        <p:cTn id="1" dur="indefinite" restart="never" nodeType="tmRoot"/>
+      </p:par>
+    </p:tnLst>
+  </p:timing>
+</p:sld>
+</file>
+
+<file path=ppt/slides/slide3.xml><?xml version="1.0" encoding="utf-8"?>
+<p:sld xmlns:a="http://schemas.openxmlformats.org/drawingml/2006/main" xmlns:r="http://schemas.openxmlformats.org/officeDocument/2006/relationships" xmlns:p="http://schemas.openxmlformats.org/presentationml/2006/main">
+  <p:cSld>
+    <p:spTree>
+      <p:nvGrpSpPr>
+        <p:cNvPr id="1" name=""/>
+        <p:cNvGrpSpPr/>
+        <p:nvPr/>
+      </p:nvGrpSpPr>
+      <p:grpSpPr>
+        <a:xfrm>
+          <a:off x="0" y="0"/>
+          <a:ext cx="0" cy="0"/>
+          <a:chOff x="0" y="0"/>
+          <a:chExt cx="0" cy="0"/>
+        </a:xfrm>
+      </p:grpSpPr>
+      <p:pic>
+        <p:nvPicPr>
+          <p:cNvPr id="1026" name="Picture 2" descr="C:\Users\Stefano\Desktop\Informatica\Maturita2021\elaborato\logo_gv.jpg"/>
+          <p:cNvPicPr>
+            <a:picLocks noChangeAspect="1" noChangeArrowheads="1"/>
+          </p:cNvPicPr>
+          <p:nvPr/>
+        </p:nvPicPr>
+        <p:blipFill>
+          <a:blip r:embed="rId2" cstate="print"/>
+          <a:srcRect/>
+          <a:stretch>
+            <a:fillRect/>
+          </a:stretch>
+        </p:blipFill>
+        <p:spPr bwMode="auto">
+          <a:xfrm>
+            <a:off x="0" y="0"/>
+            <a:ext cx="2555776" cy="863573"/>
+          </a:xfrm>
+          <a:prstGeom prst="rect">
+            <a:avLst/>
+          </a:prstGeom>
+          <a:noFill/>
+        </p:spPr>
+      </p:pic>
+      <p:sp>
+        <p:nvSpPr>
+          <p:cNvPr id="5" name="CasellaDiTesto 4"/>
+          <p:cNvSpPr txBox="1"/>
+          <p:nvPr/>
+        </p:nvSpPr>
+        <p:spPr>
+          <a:xfrm>
+            <a:off x="7320039" y="6021288"/>
+            <a:ext cx="1823961" cy="923330"/>
+          </a:xfrm>
+          <a:prstGeom prst="rect">
+            <a:avLst/>
+          </a:prstGeom>
+          <a:noFill/>
+        </p:spPr>
+        <p:txBody>
+          <a:bodyPr wrap="square" rtlCol="0">
+            <a:spAutoFit/>
+          </a:bodyPr>
+          <a:lstStyle/>
+          <a:p>
+            <a:pPr>
+              <a:lnSpc>
+                <a:spcPct val="300000"/>
+              </a:lnSpc>
+              <a:spcAft>
+                <a:spcPts val="1200"/>
+              </a:spcAft>
+            </a:pPr>
+            <a:r>
+              <a:rPr lang="it-IT" i="1" dirty="0" smtClean="0">
+                <a:solidFill>
+                  <a:schemeClr val="tx1">
+                    <a:lumMod val="85000"/>
+                    <a:lumOff val="15000"/>
+                  </a:schemeClr>
+                </a:solidFill>
+                <a:latin typeface="Times New Roman" pitchFamily="18" charset="0"/>
+                <a:cs typeface="Times New Roman" pitchFamily="18" charset="0"/>
+              </a:rPr>
+              <a:t>Lorenzo Bartolini</a:t>
+            </a:r>
+            <a:endParaRPr lang="it-IT" i="1" dirty="0">
+              <a:solidFill>
+                <a:schemeClr val="tx1">
+                  <a:lumMod val="85000"/>
+                  <a:lumOff val="15000"/>
+                </a:schemeClr>
+              </a:solidFill>
+              <a:latin typeface="Times New Roman" pitchFamily="18" charset="0"/>
+              <a:cs typeface="Times New Roman" pitchFamily="18" charset="0"/>
+            </a:endParaRPr>
+          </a:p>
+        </p:txBody>
+      </p:sp>
+      <p:sp>
+        <p:nvSpPr>
+          <p:cNvPr id="6" name="CasellaDiTesto 5"/>
+          <p:cNvSpPr txBox="1"/>
+          <p:nvPr/>
+        </p:nvSpPr>
+        <p:spPr>
+          <a:xfrm>
+            <a:off x="827584" y="1196752"/>
+            <a:ext cx="4680520" cy="584775"/>
+          </a:xfrm>
+          <a:prstGeom prst="rect">
+            <a:avLst/>
+          </a:prstGeom>
+          <a:noFill/>
+        </p:spPr>
+        <p:txBody>
+          <a:bodyPr wrap="square" rtlCol="0">
+            <a:spAutoFit/>
+          </a:bodyPr>
+          <a:lstStyle/>
+          <a:p>
+            <a:r>
+              <a:rPr lang="it-IT" sz="3200" b="1" dirty="0" smtClean="0">
+                <a:latin typeface="Times New Roman" pitchFamily="18" charset="0"/>
+                <a:cs typeface="Times New Roman" pitchFamily="18" charset="0"/>
+              </a:rPr>
+              <a:t>Attività di lavoro</a:t>
+            </a:r>
+            <a:endParaRPr lang="it-IT" sz="3200" b="1" dirty="0">
+              <a:latin typeface="Times New Roman" pitchFamily="18" charset="0"/>
+              <a:cs typeface="Times New Roman" pitchFamily="18" charset="0"/>
+            </a:endParaRPr>
+          </a:p>
+        </p:txBody>
+      </p:sp>
+      <p:sp>
+        <p:nvSpPr>
+          <p:cNvPr id="7" name="CasellaDiTesto 6"/>
+          <p:cNvSpPr txBox="1"/>
+          <p:nvPr/>
+        </p:nvSpPr>
+        <p:spPr>
+          <a:xfrm>
+            <a:off x="971600" y="2060848"/>
+            <a:ext cx="7560840" cy="3046988"/>
+          </a:xfrm>
+          <a:prstGeom prst="rect">
+            <a:avLst/>
+          </a:prstGeom>
+          <a:noFill/>
+        </p:spPr>
+        <p:txBody>
+          <a:bodyPr wrap="square" rtlCol="0">
+            <a:spAutoFit/>
+          </a:bodyPr>
+          <a:lstStyle/>
+          <a:p>
+            <a:pPr>
+              <a:buFont typeface="Arial" pitchFamily="34" charset="0"/>
+              <a:buChar char="•"/>
+            </a:pPr>
+            <a:r>
+              <a:rPr lang="it-IT" sz="2400" dirty="0" smtClean="0">
+                <a:latin typeface="Times New Roman" pitchFamily="18" charset="0"/>
+                <a:cs typeface="Times New Roman" pitchFamily="18" charset="0"/>
+              </a:rPr>
+              <a:t> </a:t>
+            </a:r>
+            <a:r>
+              <a:rPr lang="it-IT" sz="2400" dirty="0" smtClean="0">
+                <a:latin typeface="Times New Roman" pitchFamily="18" charset="0"/>
+                <a:cs typeface="Times New Roman" pitchFamily="18" charset="0"/>
+              </a:rPr>
+              <a:t>Modello di apprendimento automatizzato tramite algoritmo genetico su gioco </a:t>
+            </a:r>
+            <a:r>
+              <a:rPr lang="it-IT" sz="2400" dirty="0" err="1" smtClean="0">
+                <a:latin typeface="Times New Roman" pitchFamily="18" charset="0"/>
+                <a:cs typeface="Times New Roman" pitchFamily="18" charset="0"/>
+              </a:rPr>
+              <a:t>Pong</a:t>
+            </a:r>
+            <a:endParaRPr lang="it-IT" sz="2400" dirty="0" smtClean="0">
+              <a:latin typeface="Times New Roman" pitchFamily="18" charset="0"/>
+              <a:cs typeface="Times New Roman" pitchFamily="18" charset="0"/>
+            </a:endParaRPr>
+          </a:p>
+          <a:p>
+            <a:pPr>
+              <a:buFont typeface="Arial" pitchFamily="34" charset="0"/>
+              <a:buChar char="•"/>
+            </a:pPr>
+            <a:endParaRPr lang="it-IT" sz="2400" dirty="0" smtClean="0">
+              <a:latin typeface="Times New Roman" pitchFamily="18" charset="0"/>
+              <a:cs typeface="Times New Roman" pitchFamily="18" charset="0"/>
+            </a:endParaRPr>
+          </a:p>
+          <a:p>
+            <a:pPr>
+              <a:buFont typeface="Arial" pitchFamily="34" charset="0"/>
+              <a:buChar char="•"/>
+            </a:pPr>
+            <a:endParaRPr lang="it-IT" sz="2400" dirty="0" smtClean="0">
+              <a:latin typeface="Times New Roman" pitchFamily="18" charset="0"/>
+              <a:cs typeface="Times New Roman" pitchFamily="18" charset="0"/>
+            </a:endParaRPr>
+          </a:p>
+          <a:p>
+            <a:endParaRPr lang="it-IT" sz="2400" dirty="0" smtClean="0">
+              <a:latin typeface="Times New Roman" pitchFamily="18" charset="0"/>
+              <a:cs typeface="Times New Roman" pitchFamily="18" charset="0"/>
+            </a:endParaRPr>
+          </a:p>
+          <a:p>
+            <a:pPr>
+              <a:buFont typeface="Arial" pitchFamily="34" charset="0"/>
+              <a:buChar char="•"/>
+            </a:pPr>
+            <a:r>
+              <a:rPr lang="it-IT" sz="2400" dirty="0" smtClean="0">
+                <a:latin typeface="Times New Roman" pitchFamily="18" charset="0"/>
+                <a:cs typeface="Times New Roman" pitchFamily="18" charset="0"/>
+              </a:rPr>
+              <a:t> </a:t>
+            </a:r>
+            <a:r>
+              <a:rPr lang="it-IT" sz="2400" dirty="0" smtClean="0">
+                <a:latin typeface="Times New Roman" pitchFamily="18" charset="0"/>
+                <a:cs typeface="Times New Roman" pitchFamily="18" charset="0"/>
+              </a:rPr>
+              <a:t>Riconoscimento vocale </a:t>
+            </a:r>
+          </a:p>
+          <a:p>
+            <a:r>
+              <a:rPr lang="it-IT" sz="2400" dirty="0" smtClean="0">
+                <a:latin typeface="Times New Roman" pitchFamily="18" charset="0"/>
+                <a:cs typeface="Times New Roman" pitchFamily="18" charset="0"/>
+              </a:rPr>
+              <a:t>con Intelligenza Artificiale</a:t>
+            </a:r>
+            <a:endParaRPr lang="it-IT" sz="2400" b="1" i="1" dirty="0" smtClean="0">
+              <a:latin typeface="Times New Roman" pitchFamily="18" charset="0"/>
+              <a:cs typeface="Times New Roman" pitchFamily="18" charset="0"/>
+            </a:endParaRPr>
+          </a:p>
+          <a:p>
+            <a:endParaRPr lang="it-IT" sz="2400" i="1" dirty="0" smtClean="0">
+              <a:latin typeface="Times New Roman" pitchFamily="18" charset="0"/>
+              <a:cs typeface="Times New Roman" pitchFamily="18" charset="0"/>
+            </a:endParaRPr>
+          </a:p>
+        </p:txBody>
+      </p:sp>
+      <p:pic>
+        <p:nvPicPr>
+          <p:cNvPr id="1027" name="Picture 3" descr="C:\Users\Stefano\Desktop\Informatica\Maturita2021\presentazioni\pcto\cropped-plansoft-logo-s-1.png"/>
+          <p:cNvPicPr>
+            <a:picLocks noChangeAspect="1" noChangeArrowheads="1"/>
+          </p:cNvPicPr>
+          <p:nvPr/>
+        </p:nvPicPr>
+        <p:blipFill>
+          <a:blip r:embed="rId3" cstate="print"/>
+          <a:srcRect/>
+          <a:stretch>
+            <a:fillRect/>
+          </a:stretch>
+        </p:blipFill>
+        <p:spPr bwMode="auto">
+          <a:xfrm>
+            <a:off x="5940152" y="1268760"/>
+            <a:ext cx="2520280" cy="672074"/>
+          </a:xfrm>
+          <a:prstGeom prst="rect">
+            <a:avLst/>
+          </a:prstGeom>
+          <a:noFill/>
+        </p:spPr>
+      </p:pic>
+      <p:pic>
+        <p:nvPicPr>
+          <p:cNvPr id="2" name="Picture 2" descr="C:\Users\Stefano\Desktop\Informatica\Maturita2021\presentazioni\pcto\Pong.png"/>
+          <p:cNvPicPr>
+            <a:picLocks noChangeAspect="1" noChangeArrowheads="1"/>
+          </p:cNvPicPr>
+          <p:nvPr/>
+        </p:nvPicPr>
+        <p:blipFill>
+          <a:blip r:embed="rId4" cstate="print"/>
+          <a:srcRect/>
+          <a:stretch>
+            <a:fillRect/>
+          </a:stretch>
+        </p:blipFill>
+        <p:spPr bwMode="auto">
+          <a:xfrm>
+            <a:off x="5364088" y="2852936"/>
+            <a:ext cx="3287440" cy="2465238"/>
           </a:xfrm>
           <a:prstGeom prst="rect">
             <a:avLst/>

</xml_diff>